<commit_message>
updated weekly report slides
</commit_message>
<xml_diff>
--- a/Project Documents/10.14.pptx
+++ b/Project Documents/10.14.pptx
@@ -5899,78 +5899,150 @@
         <p:spPr/>
         <p:txBody>
           <a:bodyPr>
-            <a:normAutofit/>
+            <a:noAutofit/>
           </a:bodyPr>
           <a:lstStyle/>
           <a:p>
             <a:r>
-              <a:rPr lang="en-US" altLang="zh-CN" dirty="0"/>
+              <a:rPr lang="en-US" altLang="zh-CN" sz="2000" b="1" dirty="0">
+                <a:latin typeface="+mj-lt"/>
+              </a:rPr>
+              <a:t>Goal</a:t>
+            </a:r>
+            <a:r>
+              <a:rPr lang="en-US" altLang="zh-CN" sz="2000" dirty="0">
+                <a:latin typeface="+mj-lt"/>
+              </a:rPr>
+              <a:t>: </a:t>
+            </a:r>
+            <a:r>
+              <a:rPr lang="en-US" altLang="zh-CN" sz="2000" b="0" i="0" dirty="0">
+                <a:effectLst/>
+                <a:latin typeface="+mj-lt"/>
+              </a:rPr>
+              <a:t> designed for showing the strength of ray tracing and customize a set of attributes in </a:t>
+            </a:r>
+            <a:r>
+              <a:rPr lang="en-US" altLang="zh-CN" sz="2000" dirty="0">
+                <a:latin typeface="+mj-lt"/>
+              </a:rPr>
+              <a:t>Cycles </a:t>
+            </a:r>
+            <a:r>
+              <a:rPr lang="en-US" altLang="zh-CN" sz="2000">
+                <a:latin typeface="+mj-lt"/>
+              </a:rPr>
+              <a:t>Render Engine </a:t>
+            </a:r>
+            <a:r>
+              <a:rPr lang="en-US" altLang="zh-CN" sz="2000" b="0" i="0">
+                <a:effectLst/>
+                <a:latin typeface="+mj-lt"/>
+              </a:rPr>
+              <a:t>particular </a:t>
+            </a:r>
+            <a:r>
+              <a:rPr lang="en-US" altLang="zh-CN" sz="2000" b="0" i="0" dirty="0">
+                <a:effectLst/>
+                <a:latin typeface="+mj-lt"/>
+              </a:rPr>
+              <a:t>for food rendering.</a:t>
+            </a:r>
+            <a:endParaRPr lang="en-US" altLang="zh-CN" sz="2000" dirty="0">
+              <a:latin typeface="+mj-lt"/>
+            </a:endParaRPr>
+          </a:p>
+          <a:p>
+            <a:r>
+              <a:rPr lang="en-US" altLang="zh-CN" sz="2000" dirty="0">
+                <a:latin typeface="+mj-lt"/>
+              </a:rPr>
               <a:t>Topic: Ray Tracing </a:t>
             </a:r>
           </a:p>
           <a:p>
             <a:pPr lvl="1"/>
             <a:r>
-              <a:rPr lang="en-US" altLang="zh-CN" dirty="0"/>
+              <a:rPr lang="en-US" altLang="zh-CN" dirty="0">
+                <a:latin typeface="+mj-lt"/>
+              </a:rPr>
               <a:t>Still related to ray tracing but not really GPU ray tracer</a:t>
             </a:r>
           </a:p>
           <a:p>
             <a:pPr lvl="1"/>
             <a:r>
-              <a:rPr lang="en-US" altLang="zh-CN" b="1" dirty="0"/>
+              <a:rPr lang="en-US" altLang="zh-CN" b="1" dirty="0">
+                <a:latin typeface="+mj-lt"/>
+              </a:rPr>
               <a:t>Cycles</a:t>
             </a:r>
             <a:r>
-              <a:rPr lang="en-US" altLang="zh-CN" dirty="0"/>
+              <a:rPr lang="en-US" altLang="zh-CN" dirty="0">
+                <a:latin typeface="+mj-lt"/>
+              </a:rPr>
               <a:t> in Blender is a quite powerful path tracer renderer</a:t>
             </a:r>
           </a:p>
           <a:p>
             <a:pPr lvl="1"/>
             <a:r>
-              <a:rPr lang="en-US" altLang="zh-CN" dirty="0"/>
+              <a:rPr lang="en-US" altLang="zh-CN" dirty="0">
+                <a:latin typeface="+mj-lt"/>
+              </a:rPr>
               <a:t>Understand Ray Tracing algorithms and Cycles engine implementation</a:t>
             </a:r>
           </a:p>
           <a:p>
             <a:pPr lvl="1"/>
             <a:r>
-              <a:rPr lang="en-US" altLang="zh-CN" dirty="0"/>
+              <a:rPr lang="en-US" altLang="zh-CN" dirty="0">
+                <a:latin typeface="+mj-lt"/>
+              </a:rPr>
               <a:t>Customize Ray Tracing particularly for food models</a:t>
             </a:r>
           </a:p>
           <a:p>
             <a:r>
-              <a:rPr lang="en-US" altLang="zh-CN" dirty="0"/>
+              <a:rPr lang="en-US" altLang="zh-CN" sz="2000" dirty="0">
+                <a:latin typeface="+mj-lt"/>
+              </a:rPr>
               <a:t>Build a scene which is suitable for showing ray tracing property</a:t>
             </a:r>
           </a:p>
           <a:p>
             <a:pPr lvl="1"/>
             <a:r>
-              <a:rPr lang="en-US" altLang="zh-CN" dirty="0"/>
+              <a:rPr lang="en-US" altLang="zh-CN" dirty="0">
+                <a:latin typeface="+mj-lt"/>
+              </a:rPr>
               <a:t>San Miguel Scene – discard this plan</a:t>
             </a:r>
           </a:p>
           <a:p>
             <a:pPr lvl="2"/>
             <a:r>
-              <a:rPr lang="en-US" altLang="zh-CN" dirty="0"/>
+              <a:rPr lang="en-US" altLang="zh-CN" sz="2000" dirty="0">
+                <a:latin typeface="+mj-lt"/>
+              </a:rPr>
               <a:t>Too complicated – time consuming for rendering </a:t>
             </a:r>
           </a:p>
           <a:p>
             <a:pPr lvl="1"/>
             <a:r>
-              <a:rPr lang="en-US" altLang="zh-CN" dirty="0"/>
+              <a:rPr lang="en-US" altLang="zh-CN" dirty="0">
+                <a:latin typeface="+mj-lt"/>
+              </a:rPr>
               <a:t>Besides donuts, other models of food should be added</a:t>
             </a:r>
           </a:p>
           <a:p>
             <a:pPr lvl="2"/>
             <a:r>
-              <a:rPr lang="en-US" altLang="zh-CN" dirty="0"/>
+              <a:rPr lang="en-US" altLang="zh-CN" sz="2000" dirty="0">
+                <a:latin typeface="+mj-lt"/>
+              </a:rPr>
               <a:t>Plan to modeling the grilled fish in a iron plate</a:t>
             </a:r>
           </a:p>
@@ -5981,7 +6053,7 @@
             <a:endParaRPr lang="en-US" altLang="zh-CN" dirty="0"/>
           </a:p>
           <a:p>
-            <a:endParaRPr lang="zh-CN" altLang="en-US" dirty="0"/>
+            <a:endParaRPr lang="zh-CN" altLang="en-US" sz="2000" dirty="0"/>
           </a:p>
         </p:txBody>
       </p:sp>
@@ -6427,15 +6499,20 @@
           <a:p>
             <a:r>
               <a:rPr lang="en-US" altLang="zh-CN" sz="3600" dirty="0"/>
-              <a:t>Blender Add-on programming</a:t>
+              <a:t>Blender Add-on</a:t>
             </a:r>
           </a:p>
           <a:p>
             <a:r>
               <a:rPr lang="en-US" altLang="zh-CN" sz="3600" dirty="0"/>
-              <a:t>Built a small add-on tool for recording operation histories and auto-save UVs</a:t>
-            </a:r>
-            <a:endParaRPr lang="zh-CN" altLang="en-US" sz="3600" dirty="0"/>
+              <a:t>Blender directory structures</a:t>
+            </a:r>
+          </a:p>
+          <a:p>
+            <a:r>
+              <a:rPr lang="en-US" altLang="zh-CN" sz="3600" dirty="0"/>
+              <a:t>python scripting</a:t>
+            </a:r>
           </a:p>
         </p:txBody>
       </p:sp>

</xml_diff>